<commit_message>
probably maybe final version
</commit_message>
<xml_diff>
--- a/Documentation/Presentation.pptx
+++ b/Documentation/Presentation.pptx
@@ -6656,8 +6656,8 @@
         </p:nvSpPr>
         <p:spPr>
           <a:xfrm>
-            <a:off x="677334" y="609600"/>
-            <a:ext cx="4667839" cy="992957"/>
+            <a:off x="1191952" y="755261"/>
+            <a:ext cx="4016894" cy="992957"/>
           </a:xfrm>
         </p:spPr>
         <p:txBody>
@@ -6690,7 +6690,7 @@
         </p:nvSpPr>
         <p:spPr>
           <a:xfrm>
-            <a:off x="5345173" y="1469010"/>
+            <a:off x="6256044" y="1748218"/>
             <a:ext cx="3602435" cy="992957"/>
           </a:xfrm>
           <a:prstGeom prst="rect">
@@ -6798,7 +6798,7 @@
         </p:nvSpPr>
         <p:spPr>
           <a:xfrm>
-            <a:off x="982134" y="2932521"/>
+            <a:off x="1457800" y="3177288"/>
             <a:ext cx="4504266" cy="992957"/>
           </a:xfrm>
           <a:prstGeom prst="rect">
@@ -6892,106 +6892,47 @@
       </p:sp>
       <p:sp>
         <p:nvSpPr>
-          <p:cNvPr id="6" name="Title 1">
+          <p:cNvPr id="9" name="TextBox 8">
             <a:extLst>
               <a:ext uri="{FF2B5EF4-FFF2-40B4-BE49-F238E27FC236}">
-                <a16:creationId xmlns:a16="http://schemas.microsoft.com/office/drawing/2014/main" id="{6EA15E3E-1285-F588-5982-79690C839334}"/>
+                <a16:creationId xmlns:a16="http://schemas.microsoft.com/office/drawing/2014/main" id="{B2A2D46F-30A6-71E7-71B5-23C6EEF9647C}"/>
               </a:ext>
             </a:extLst>
           </p:cNvPr>
-          <p:cNvSpPr txBox="1">
-            <a:spLocks/>
-          </p:cNvSpPr>
+          <p:cNvSpPr txBox="1"/>
           <p:nvPr/>
         </p:nvSpPr>
         <p:spPr>
           <a:xfrm>
-            <a:off x="4254310" y="4727580"/>
-            <a:ext cx="5274701" cy="2210587"/>
+            <a:off x="4713102" y="4969080"/>
+            <a:ext cx="6103854" cy="784830"/>
           </a:xfrm>
           <a:prstGeom prst="rect">
             <a:avLst/>
           </a:prstGeom>
+          <a:noFill/>
         </p:spPr>
         <p:txBody>
-          <a:bodyPr vert="horz" lIns="91440" tIns="45720" rIns="91440" bIns="45720" rtlCol="0" anchor="t">
-            <a:noAutofit/>
+          <a:bodyPr wrap="square">
+            <a:spAutoFit/>
           </a:bodyPr>
-          <a:lstStyle>
-            <a:lvl1pPr algn="l" defTabSz="457200" rtl="0" eaLnBrk="1" latinLnBrk="0" hangingPunct="1">
-              <a:spcBef>
-                <a:spcPct val="0"/>
-              </a:spcBef>
-              <a:buNone/>
-              <a:defRPr sz="3600" kern="1200">
+          <a:lstStyle/>
+          <a:p>
+            <a:r>
+              <a:rPr kumimoji="0" lang="en-US" sz="4500" b="0" i="0" u="none" strike="noStrike" kern="1200" cap="none" spc="0" normalizeH="0" baseline="0" noProof="0" dirty="0">
+                <a:ln>
+                  <a:noFill/>
+                </a:ln>
                 <a:solidFill>
-                  <a:schemeClr val="accent1"/>
+                  <a:srgbClr val="90C226"/>
                 </a:solidFill>
-                <a:latin typeface="+mj-lt"/>
+                <a:effectLst/>
+                <a:uLnTx/>
+                <a:uFillTx/>
+                <a:latin typeface="Trebuchet MS" panose="020B0603020202020204"/>
                 <a:ea typeface="+mj-ea"/>
                 <a:cs typeface="+mj-cs"/>
-              </a:defRPr>
-            </a:lvl1pPr>
-            <a:lvl2pPr eaLnBrk="1" hangingPunct="1">
-              <a:defRPr>
-                <a:solidFill>
-                  <a:schemeClr val="tx2"/>
-                </a:solidFill>
-              </a:defRPr>
-            </a:lvl2pPr>
-            <a:lvl3pPr eaLnBrk="1" hangingPunct="1">
-              <a:defRPr>
-                <a:solidFill>
-                  <a:schemeClr val="tx2"/>
-                </a:solidFill>
-              </a:defRPr>
-            </a:lvl3pPr>
-            <a:lvl4pPr eaLnBrk="1" hangingPunct="1">
-              <a:defRPr>
-                <a:solidFill>
-                  <a:schemeClr val="tx2"/>
-                </a:solidFill>
-              </a:defRPr>
-            </a:lvl4pPr>
-            <a:lvl5pPr eaLnBrk="1" hangingPunct="1">
-              <a:defRPr>
-                <a:solidFill>
-                  <a:schemeClr val="tx2"/>
-                </a:solidFill>
-              </a:defRPr>
-            </a:lvl5pPr>
-            <a:lvl6pPr eaLnBrk="1" hangingPunct="1">
-              <a:defRPr>
-                <a:solidFill>
-                  <a:schemeClr val="tx2"/>
-                </a:solidFill>
-              </a:defRPr>
-            </a:lvl6pPr>
-            <a:lvl7pPr eaLnBrk="1" hangingPunct="1">
-              <a:defRPr>
-                <a:solidFill>
-                  <a:schemeClr val="tx2"/>
-                </a:solidFill>
-              </a:defRPr>
-            </a:lvl7pPr>
-            <a:lvl8pPr eaLnBrk="1" hangingPunct="1">
-              <a:defRPr>
-                <a:solidFill>
-                  <a:schemeClr val="tx2"/>
-                </a:solidFill>
-              </a:defRPr>
-            </a:lvl8pPr>
-            <a:lvl9pPr eaLnBrk="1" hangingPunct="1">
-              <a:defRPr>
-                <a:solidFill>
-                  <a:schemeClr val="tx2"/>
-                </a:solidFill>
-              </a:defRPr>
-            </a:lvl9pPr>
-          </a:lstStyle>
-          <a:p>
-            <a:r>
-              <a:rPr lang="en-US" sz="4500" dirty="0"/>
+              </a:rPr>
               <a:t>Low consumption</a:t>
             </a:r>
             <a:endParaRPr lang="hu-HU" sz="4500" dirty="0"/>

</xml_diff>

<commit_message>
final version 2 (ppt changes)
</commit_message>
<xml_diff>
--- a/Documentation/Presentation.pptx
+++ b/Documentation/Presentation.pptx
@@ -5,7 +5,7 @@
     <p:sldMasterId id="2147483660" r:id="rId1"/>
   </p:sldMasterIdLst>
   <p:notesMasterIdLst>
-    <p:notesMasterId r:id="rId14"/>
+    <p:notesMasterId r:id="rId13"/>
   </p:notesMasterIdLst>
   <p:sldIdLst>
     <p:sldId id="256" r:id="rId2"/>
@@ -19,7 +19,6 @@
     <p:sldId id="269" r:id="rId10"/>
     <p:sldId id="270" r:id="rId11"/>
     <p:sldId id="271" r:id="rId12"/>
-    <p:sldId id="265" r:id="rId13"/>
   </p:sldIdLst>
   <p:sldSz cx="12192000" cy="6858000"/>
   <p:notesSz cx="6858000" cy="9144000"/>
@@ -6621,337 +6620,6 @@
 </p:sld>
 </file>
 
-<file path=ppt/slides/slide12.xml><?xml version="1.0" encoding="utf-8"?>
-<p:sld xmlns:a="http://schemas.openxmlformats.org/drawingml/2006/main" xmlns:r="http://schemas.openxmlformats.org/officeDocument/2006/relationships" xmlns:p="http://schemas.openxmlformats.org/presentationml/2006/main">
-  <p:cSld>
-    <p:spTree>
-      <p:nvGrpSpPr>
-        <p:cNvPr id="1" name=""/>
-        <p:cNvGrpSpPr/>
-        <p:nvPr/>
-      </p:nvGrpSpPr>
-      <p:grpSpPr>
-        <a:xfrm>
-          <a:off x="0" y="0"/>
-          <a:ext cx="0" cy="0"/>
-          <a:chOff x="0" y="0"/>
-          <a:chExt cx="0" cy="0"/>
-        </a:xfrm>
-      </p:grpSpPr>
-      <p:sp>
-        <p:nvSpPr>
-          <p:cNvPr id="2" name="Title 1">
-            <a:extLst>
-              <a:ext uri="{FF2B5EF4-FFF2-40B4-BE49-F238E27FC236}">
-                <a16:creationId xmlns:a16="http://schemas.microsoft.com/office/drawing/2014/main" id="{A0705D0A-A58D-CF75-85E6-2D39DE3A5E23}"/>
-              </a:ext>
-            </a:extLst>
-          </p:cNvPr>
-          <p:cNvSpPr>
-            <a:spLocks noGrp="1"/>
-          </p:cNvSpPr>
-          <p:nvPr>
-            <p:ph type="title"/>
-          </p:nvPr>
-        </p:nvSpPr>
-        <p:spPr>
-          <a:xfrm>
-            <a:off x="1191952" y="755261"/>
-            <a:ext cx="4016894" cy="992957"/>
-          </a:xfrm>
-        </p:spPr>
-        <p:txBody>
-          <a:bodyPr>
-            <a:noAutofit/>
-          </a:bodyPr>
-          <a:lstStyle/>
-          <a:p>
-            <a:r>
-              <a:rPr lang="en-US" sz="4500" dirty="0"/>
-              <a:t>Easy to install</a:t>
-            </a:r>
-            <a:endParaRPr lang="hu-HU" sz="4500" dirty="0"/>
-          </a:p>
-        </p:txBody>
-      </p:sp>
-      <p:sp>
-        <p:nvSpPr>
-          <p:cNvPr id="4" name="Title 1">
-            <a:extLst>
-              <a:ext uri="{FF2B5EF4-FFF2-40B4-BE49-F238E27FC236}">
-                <a16:creationId xmlns:a16="http://schemas.microsoft.com/office/drawing/2014/main" id="{1259AA44-F20C-A378-6639-3AB286B65A85}"/>
-              </a:ext>
-            </a:extLst>
-          </p:cNvPr>
-          <p:cNvSpPr txBox="1">
-            <a:spLocks/>
-          </p:cNvSpPr>
-          <p:nvPr/>
-        </p:nvSpPr>
-        <p:spPr>
-          <a:xfrm>
-            <a:off x="6256044" y="1748218"/>
-            <a:ext cx="3602435" cy="992957"/>
-          </a:xfrm>
-          <a:prstGeom prst="rect">
-            <a:avLst/>
-          </a:prstGeom>
-        </p:spPr>
-        <p:txBody>
-          <a:bodyPr vert="horz" lIns="91440" tIns="45720" rIns="91440" bIns="45720" rtlCol="0" anchor="t">
-            <a:normAutofit/>
-          </a:bodyPr>
-          <a:lstStyle>
-            <a:lvl1pPr algn="l" defTabSz="457200" rtl="0" eaLnBrk="1" latinLnBrk="0" hangingPunct="1">
-              <a:spcBef>
-                <a:spcPct val="0"/>
-              </a:spcBef>
-              <a:buNone/>
-              <a:defRPr sz="3600" kern="1200">
-                <a:solidFill>
-                  <a:schemeClr val="accent1"/>
-                </a:solidFill>
-                <a:latin typeface="+mj-lt"/>
-                <a:ea typeface="+mj-ea"/>
-                <a:cs typeface="+mj-cs"/>
-              </a:defRPr>
-            </a:lvl1pPr>
-            <a:lvl2pPr eaLnBrk="1" hangingPunct="1">
-              <a:defRPr>
-                <a:solidFill>
-                  <a:schemeClr val="tx2"/>
-                </a:solidFill>
-              </a:defRPr>
-            </a:lvl2pPr>
-            <a:lvl3pPr eaLnBrk="1" hangingPunct="1">
-              <a:defRPr>
-                <a:solidFill>
-                  <a:schemeClr val="tx2"/>
-                </a:solidFill>
-              </a:defRPr>
-            </a:lvl3pPr>
-            <a:lvl4pPr eaLnBrk="1" hangingPunct="1">
-              <a:defRPr>
-                <a:solidFill>
-                  <a:schemeClr val="tx2"/>
-                </a:solidFill>
-              </a:defRPr>
-            </a:lvl4pPr>
-            <a:lvl5pPr eaLnBrk="1" hangingPunct="1">
-              <a:defRPr>
-                <a:solidFill>
-                  <a:schemeClr val="tx2"/>
-                </a:solidFill>
-              </a:defRPr>
-            </a:lvl5pPr>
-            <a:lvl6pPr eaLnBrk="1" hangingPunct="1">
-              <a:defRPr>
-                <a:solidFill>
-                  <a:schemeClr val="tx2"/>
-                </a:solidFill>
-              </a:defRPr>
-            </a:lvl6pPr>
-            <a:lvl7pPr eaLnBrk="1" hangingPunct="1">
-              <a:defRPr>
-                <a:solidFill>
-                  <a:schemeClr val="tx2"/>
-                </a:solidFill>
-              </a:defRPr>
-            </a:lvl7pPr>
-            <a:lvl8pPr eaLnBrk="1" hangingPunct="1">
-              <a:defRPr>
-                <a:solidFill>
-                  <a:schemeClr val="tx2"/>
-                </a:solidFill>
-              </a:defRPr>
-            </a:lvl8pPr>
-            <a:lvl9pPr eaLnBrk="1" hangingPunct="1">
-              <a:defRPr>
-                <a:solidFill>
-                  <a:schemeClr val="tx2"/>
-                </a:solidFill>
-              </a:defRPr>
-            </a:lvl9pPr>
-          </a:lstStyle>
-          <a:p>
-            <a:r>
-              <a:rPr lang="en-US" sz="4500" dirty="0"/>
-              <a:t>Scalable</a:t>
-            </a:r>
-            <a:endParaRPr lang="hu-HU" sz="4500" dirty="0"/>
-          </a:p>
-        </p:txBody>
-      </p:sp>
-      <p:sp>
-        <p:nvSpPr>
-          <p:cNvPr id="5" name="Title 1">
-            <a:extLst>
-              <a:ext uri="{FF2B5EF4-FFF2-40B4-BE49-F238E27FC236}">
-                <a16:creationId xmlns:a16="http://schemas.microsoft.com/office/drawing/2014/main" id="{9D94D656-A5D5-5C1F-190F-41D0BFD06445}"/>
-              </a:ext>
-            </a:extLst>
-          </p:cNvPr>
-          <p:cNvSpPr txBox="1">
-            <a:spLocks/>
-          </p:cNvSpPr>
-          <p:nvPr/>
-        </p:nvSpPr>
-        <p:spPr>
-          <a:xfrm>
-            <a:off x="1457800" y="3177288"/>
-            <a:ext cx="4504266" cy="992957"/>
-          </a:xfrm>
-          <a:prstGeom prst="rect">
-            <a:avLst/>
-          </a:prstGeom>
-        </p:spPr>
-        <p:txBody>
-          <a:bodyPr vert="horz" lIns="91440" tIns="45720" rIns="91440" bIns="45720" rtlCol="0" anchor="t">
-            <a:noAutofit/>
-          </a:bodyPr>
-          <a:lstStyle>
-            <a:lvl1pPr algn="l" defTabSz="457200" rtl="0" eaLnBrk="1" latinLnBrk="0" hangingPunct="1">
-              <a:spcBef>
-                <a:spcPct val="0"/>
-              </a:spcBef>
-              <a:buNone/>
-              <a:defRPr sz="3600" kern="1200">
-                <a:solidFill>
-                  <a:schemeClr val="accent1"/>
-                </a:solidFill>
-                <a:latin typeface="+mj-lt"/>
-                <a:ea typeface="+mj-ea"/>
-                <a:cs typeface="+mj-cs"/>
-              </a:defRPr>
-            </a:lvl1pPr>
-            <a:lvl2pPr eaLnBrk="1" hangingPunct="1">
-              <a:defRPr>
-                <a:solidFill>
-                  <a:schemeClr val="tx2"/>
-                </a:solidFill>
-              </a:defRPr>
-            </a:lvl2pPr>
-            <a:lvl3pPr eaLnBrk="1" hangingPunct="1">
-              <a:defRPr>
-                <a:solidFill>
-                  <a:schemeClr val="tx2"/>
-                </a:solidFill>
-              </a:defRPr>
-            </a:lvl3pPr>
-            <a:lvl4pPr eaLnBrk="1" hangingPunct="1">
-              <a:defRPr>
-                <a:solidFill>
-                  <a:schemeClr val="tx2"/>
-                </a:solidFill>
-              </a:defRPr>
-            </a:lvl4pPr>
-            <a:lvl5pPr eaLnBrk="1" hangingPunct="1">
-              <a:defRPr>
-                <a:solidFill>
-                  <a:schemeClr val="tx2"/>
-                </a:solidFill>
-              </a:defRPr>
-            </a:lvl5pPr>
-            <a:lvl6pPr eaLnBrk="1" hangingPunct="1">
-              <a:defRPr>
-                <a:solidFill>
-                  <a:schemeClr val="tx2"/>
-                </a:solidFill>
-              </a:defRPr>
-            </a:lvl6pPr>
-            <a:lvl7pPr eaLnBrk="1" hangingPunct="1">
-              <a:defRPr>
-                <a:solidFill>
-                  <a:schemeClr val="tx2"/>
-                </a:solidFill>
-              </a:defRPr>
-            </a:lvl7pPr>
-            <a:lvl8pPr eaLnBrk="1" hangingPunct="1">
-              <a:defRPr>
-                <a:solidFill>
-                  <a:schemeClr val="tx2"/>
-                </a:solidFill>
-              </a:defRPr>
-            </a:lvl8pPr>
-            <a:lvl9pPr eaLnBrk="1" hangingPunct="1">
-              <a:defRPr>
-                <a:solidFill>
-                  <a:schemeClr val="tx2"/>
-                </a:solidFill>
-              </a:defRPr>
-            </a:lvl9pPr>
-          </a:lstStyle>
-          <a:p>
-            <a:r>
-              <a:rPr lang="en-US" sz="4500" dirty="0"/>
-              <a:t>Multi-purpose</a:t>
-            </a:r>
-            <a:endParaRPr lang="hu-HU" sz="4500" dirty="0"/>
-          </a:p>
-        </p:txBody>
-      </p:sp>
-      <p:sp>
-        <p:nvSpPr>
-          <p:cNvPr id="9" name="TextBox 8">
-            <a:extLst>
-              <a:ext uri="{FF2B5EF4-FFF2-40B4-BE49-F238E27FC236}">
-                <a16:creationId xmlns:a16="http://schemas.microsoft.com/office/drawing/2014/main" id="{B2A2D46F-30A6-71E7-71B5-23C6EEF9647C}"/>
-              </a:ext>
-            </a:extLst>
-          </p:cNvPr>
-          <p:cNvSpPr txBox="1"/>
-          <p:nvPr/>
-        </p:nvSpPr>
-        <p:spPr>
-          <a:xfrm>
-            <a:off x="4713102" y="4969080"/>
-            <a:ext cx="6103854" cy="784830"/>
-          </a:xfrm>
-          <a:prstGeom prst="rect">
-            <a:avLst/>
-          </a:prstGeom>
-          <a:noFill/>
-        </p:spPr>
-        <p:txBody>
-          <a:bodyPr wrap="square">
-            <a:spAutoFit/>
-          </a:bodyPr>
-          <a:lstStyle/>
-          <a:p>
-            <a:r>
-              <a:rPr kumimoji="0" lang="en-US" sz="4500" b="0" i="0" u="none" strike="noStrike" kern="1200" cap="none" spc="0" normalizeH="0" baseline="0" noProof="0" dirty="0">
-                <a:ln>
-                  <a:noFill/>
-                </a:ln>
-                <a:solidFill>
-                  <a:srgbClr val="90C226"/>
-                </a:solidFill>
-                <a:effectLst/>
-                <a:uLnTx/>
-                <a:uFillTx/>
-                <a:latin typeface="Trebuchet MS" panose="020B0603020202020204"/>
-                <a:ea typeface="+mj-ea"/>
-                <a:cs typeface="+mj-cs"/>
-              </a:rPr>
-              <a:t>Low consumption</a:t>
-            </a:r>
-            <a:endParaRPr lang="hu-HU" sz="4500" dirty="0"/>
-          </a:p>
-        </p:txBody>
-      </p:sp>
-    </p:spTree>
-    <p:extLst>
-      <p:ext uri="{BB962C8B-B14F-4D97-AF65-F5344CB8AC3E}">
-        <p14:creationId xmlns:p14="http://schemas.microsoft.com/office/powerpoint/2010/main" val="2200446706"/>
-      </p:ext>
-    </p:extLst>
-  </p:cSld>
-  <p:clrMapOvr>
-    <a:masterClrMapping/>
-  </p:clrMapOvr>
-</p:sld>
-</file>
-
 <file path=ppt/slides/slide2.xml><?xml version="1.0" encoding="utf-8"?>
 <p:sld xmlns:a="http://schemas.openxmlformats.org/drawingml/2006/main" xmlns:r="http://schemas.openxmlformats.org/officeDocument/2006/relationships" xmlns:p="http://schemas.openxmlformats.org/presentationml/2006/main">
   <p:cSld>
@@ -10500,7 +10168,7 @@
             <a:pPr lvl="1"/>
             <a:r>
               <a:rPr lang="en-US" dirty="0"/>
-              <a:t>PCB + assembly cost for one pair of devices: 57 USD</a:t>
+              <a:t>PCB + assembly cost for one pair of devices: 57 EUR</a:t>
             </a:r>
           </a:p>
           <a:p>

</xml_diff>